<commit_message>
finish graph and portal
</commit_message>
<xml_diff>
--- a/Team 3 Project Deliverable/Final Presentation.pptx
+++ b/Team 3 Project Deliverable/Final Presentation.pptx
@@ -4,9 +4,18 @@
   <p:sldMasterIdLst>
     <p:sldMasterId id="2147483648" r:id="rId1"/>
   </p:sldMasterIdLst>
+  <p:notesMasterIdLst>
+    <p:notesMasterId r:id="rId10"/>
+  </p:notesMasterIdLst>
   <p:sldIdLst>
     <p:sldId id="256" r:id="rId2"/>
     <p:sldId id="257" r:id="rId3"/>
+    <p:sldId id="263" r:id="rId4"/>
+    <p:sldId id="264" r:id="rId5"/>
+    <p:sldId id="265" r:id="rId6"/>
+    <p:sldId id="266" r:id="rId7"/>
+    <p:sldId id="267" r:id="rId8"/>
+    <p:sldId id="262" r:id="rId9"/>
   </p:sldIdLst>
   <p:sldSz cx="12192000" cy="6858000"/>
   <p:notesSz cx="6858000" cy="9144000"/>
@@ -105,13 +114,18 @@
       </a:defRPr>
     </a:lvl9pPr>
   </p:defaultTextStyle>
+  <p:extLst>
+    <p:ext uri="{EFAFB233-063F-42B5-8137-9DF3F51BA10A}">
+      <p15:sldGuideLst xmlns:p15="http://schemas.microsoft.com/office/powerpoint/2012/main"/>
+    </p:ext>
+  </p:extLst>
 </p:presentation>
 </file>
 
 <file path=ppt/revisionInfo.xml><?xml version="1.0" encoding="utf-8"?>
 <p1510:revInfo xmlns:a="http://schemas.openxmlformats.org/drawingml/2006/main" xmlns:r="http://schemas.openxmlformats.org/officeDocument/2006/relationships" xmlns:p1510="http://schemas.microsoft.com/office/powerpoint/2015/10/main">
   <p1510:revLst>
-    <p1510:client id="{79DF058E-2E0C-4722-BE4F-4C1F25848637}" v="1" dt="2022-05-02T06:03:07.779"/>
+    <p1510:client id="{79DF058E-2E0C-4722-BE4F-4C1F25848637}" v="13" dt="2022-05-03T04:28:09.435"/>
   </p1510:revLst>
 </p1510:revInfo>
 </file>
@@ -121,7 +135,7 @@
   <pc:docChgLst>
     <pc:chgData name="之皓 辜" userId="7e541bd579ed2d47" providerId="LiveId" clId="{79DF058E-2E0C-4722-BE4F-4C1F25848637}"/>
     <pc:docChg chg="undo custSel addSld modSld">
-      <pc:chgData name="之皓 辜" userId="7e541bd579ed2d47" providerId="LiveId" clId="{79DF058E-2E0C-4722-BE4F-4C1F25848637}" dt="2022-05-02T06:03:07.779" v="44"/>
+      <pc:chgData name="之皓 辜" userId="7e541bd579ed2d47" providerId="LiveId" clId="{79DF058E-2E0C-4722-BE4F-4C1F25848637}" dt="2022-05-03T05:41:13.350" v="612" actId="20577"/>
       <pc:docMkLst>
         <pc:docMk/>
       </pc:docMkLst>
@@ -171,9 +185,548 @@
           </ac:spMkLst>
         </pc:spChg>
       </pc:sldChg>
+      <pc:sldChg chg="addSp delSp modSp add mod">
+        <pc:chgData name="之皓 辜" userId="7e541bd579ed2d47" providerId="LiveId" clId="{79DF058E-2E0C-4722-BE4F-4C1F25848637}" dt="2022-05-03T05:41:13.350" v="612" actId="20577"/>
+        <pc:sldMkLst>
+          <pc:docMk/>
+          <pc:sldMk cId="2961724078" sldId="262"/>
+        </pc:sldMkLst>
+        <pc:spChg chg="mod">
+          <ac:chgData name="之皓 辜" userId="7e541bd579ed2d47" providerId="LiveId" clId="{79DF058E-2E0C-4722-BE4F-4C1F25848637}" dt="2022-05-03T05:41:13.350" v="612" actId="20577"/>
+          <ac:spMkLst>
+            <pc:docMk/>
+            <pc:sldMk cId="2961724078" sldId="262"/>
+            <ac:spMk id="3" creationId="{99AB12A4-8D4F-4DA7-B215-CF50025A5537}"/>
+          </ac:spMkLst>
+        </pc:spChg>
+        <pc:spChg chg="add del">
+          <ac:chgData name="之皓 辜" userId="7e541bd579ed2d47" providerId="LiveId" clId="{79DF058E-2E0C-4722-BE4F-4C1F25848637}" dt="2022-05-03T04:28:05.642" v="254"/>
+          <ac:spMkLst>
+            <pc:docMk/>
+            <pc:sldMk cId="2961724078" sldId="262"/>
+            <ac:spMk id="4" creationId="{8603F507-29EE-BE5A-963B-43CB77122255}"/>
+          </ac:spMkLst>
+        </pc:spChg>
+        <pc:spChg chg="add del">
+          <ac:chgData name="之皓 辜" userId="7e541bd579ed2d47" providerId="LiveId" clId="{79DF058E-2E0C-4722-BE4F-4C1F25848637}" dt="2022-05-03T04:28:07.524" v="256"/>
+          <ac:spMkLst>
+            <pc:docMk/>
+            <pc:sldMk cId="2961724078" sldId="262"/>
+            <ac:spMk id="5" creationId="{F77DC9FE-D42D-C43C-8D1C-DCFAA38E9102}"/>
+          </ac:spMkLst>
+        </pc:spChg>
+        <pc:spChg chg="add del">
+          <ac:chgData name="之皓 辜" userId="7e541bd579ed2d47" providerId="LiveId" clId="{79DF058E-2E0C-4722-BE4F-4C1F25848637}" dt="2022-05-03T04:28:09.435" v="258"/>
+          <ac:spMkLst>
+            <pc:docMk/>
+            <pc:sldMk cId="2961724078" sldId="262"/>
+            <ac:spMk id="6" creationId="{A532B2A6-7028-E065-B0A6-5CF8C095E782}"/>
+          </ac:spMkLst>
+        </pc:spChg>
+      </pc:sldChg>
+      <pc:sldChg chg="new">
+        <pc:chgData name="之皓 辜" userId="7e541bd579ed2d47" providerId="LiveId" clId="{79DF058E-2E0C-4722-BE4F-4C1F25848637}" dt="2022-05-03T04:30:05.554" v="267" actId="680"/>
+        <pc:sldMkLst>
+          <pc:docMk/>
+          <pc:sldMk cId="2135914280" sldId="263"/>
+        </pc:sldMkLst>
+      </pc:sldChg>
+      <pc:sldChg chg="new">
+        <pc:chgData name="之皓 辜" userId="7e541bd579ed2d47" providerId="LiveId" clId="{79DF058E-2E0C-4722-BE4F-4C1F25848637}" dt="2022-05-03T04:30:05.770" v="268" actId="680"/>
+        <pc:sldMkLst>
+          <pc:docMk/>
+          <pc:sldMk cId="1022795079" sldId="264"/>
+        </pc:sldMkLst>
+      </pc:sldChg>
+      <pc:sldChg chg="new">
+        <pc:chgData name="之皓 辜" userId="7e541bd579ed2d47" providerId="LiveId" clId="{79DF058E-2E0C-4722-BE4F-4C1F25848637}" dt="2022-05-03T04:30:05.972" v="269" actId="680"/>
+        <pc:sldMkLst>
+          <pc:docMk/>
+          <pc:sldMk cId="3305979141" sldId="265"/>
+        </pc:sldMkLst>
+      </pc:sldChg>
+      <pc:sldChg chg="new">
+        <pc:chgData name="之皓 辜" userId="7e541bd579ed2d47" providerId="LiveId" clId="{79DF058E-2E0C-4722-BE4F-4C1F25848637}" dt="2022-05-03T04:30:06.132" v="270" actId="680"/>
+        <pc:sldMkLst>
+          <pc:docMk/>
+          <pc:sldMk cId="3954431065" sldId="266"/>
+        </pc:sldMkLst>
+      </pc:sldChg>
+      <pc:sldChg chg="addSp delSp modSp new mod">
+        <pc:chgData name="之皓 辜" userId="7e541bd579ed2d47" providerId="LiveId" clId="{79DF058E-2E0C-4722-BE4F-4C1F25848637}" dt="2022-05-03T05:33:37.162" v="604" actId="20577"/>
+        <pc:sldMkLst>
+          <pc:docMk/>
+          <pc:sldMk cId="2036234987" sldId="267"/>
+        </pc:sldMkLst>
+        <pc:spChg chg="mod">
+          <ac:chgData name="之皓 辜" userId="7e541bd579ed2d47" providerId="LiveId" clId="{79DF058E-2E0C-4722-BE4F-4C1F25848637}" dt="2022-05-03T04:59:41.209" v="493" actId="20577"/>
+          <ac:spMkLst>
+            <pc:docMk/>
+            <pc:sldMk cId="2036234987" sldId="267"/>
+            <ac:spMk id="2" creationId="{E99262E5-A774-8DEC-1449-24D499ADC7DC}"/>
+          </ac:spMkLst>
+        </pc:spChg>
+        <pc:spChg chg="del">
+          <ac:chgData name="之皓 辜" userId="7e541bd579ed2d47" providerId="LiveId" clId="{79DF058E-2E0C-4722-BE4F-4C1F25848637}" dt="2022-05-03T04:57:47.364" v="485" actId="22"/>
+          <ac:spMkLst>
+            <pc:docMk/>
+            <pc:sldMk cId="2036234987" sldId="267"/>
+            <ac:spMk id="3" creationId="{7716FAC1-2DC6-E342-8FE8-AD2FA219FB8B}"/>
+          </ac:spMkLst>
+        </pc:spChg>
+        <pc:spChg chg="add mod">
+          <ac:chgData name="之皓 辜" userId="7e541bd579ed2d47" providerId="LiveId" clId="{79DF058E-2E0C-4722-BE4F-4C1F25848637}" dt="2022-05-03T05:33:37.162" v="604" actId="20577"/>
+          <ac:spMkLst>
+            <pc:docMk/>
+            <pc:sldMk cId="2036234987" sldId="267"/>
+            <ac:spMk id="7" creationId="{44E7CEC9-BA37-73CA-1FC5-F16C873A3BBA}"/>
+          </ac:spMkLst>
+        </pc:spChg>
+        <pc:picChg chg="add del mod ord">
+          <ac:chgData name="之皓 辜" userId="7e541bd579ed2d47" providerId="LiveId" clId="{79DF058E-2E0C-4722-BE4F-4C1F25848637}" dt="2022-05-03T04:58:11.080" v="487" actId="478"/>
+          <ac:picMkLst>
+            <pc:docMk/>
+            <pc:sldMk cId="2036234987" sldId="267"/>
+            <ac:picMk id="5" creationId="{73A7FB54-2FE2-9C60-857A-7946F17729BF}"/>
+          </ac:picMkLst>
+        </pc:picChg>
+      </pc:sldChg>
     </pc:docChg>
   </pc:docChgLst>
 </pc:chgInfo>
+</file>
+
+<file path=ppt/notesMasters/notesMaster1.xml><?xml version="1.0" encoding="utf-8"?>
+<p:notesMaster xmlns:a="http://schemas.openxmlformats.org/drawingml/2006/main" xmlns:r="http://schemas.openxmlformats.org/officeDocument/2006/relationships" xmlns:p="http://schemas.openxmlformats.org/presentationml/2006/main">
+  <p:cSld>
+    <p:bg>
+      <p:bgRef idx="1001">
+        <a:schemeClr val="bg1"/>
+      </p:bgRef>
+    </p:bg>
+    <p:spTree>
+      <p:nvGrpSpPr>
+        <p:cNvPr id="1" name=""/>
+        <p:cNvGrpSpPr/>
+        <p:nvPr/>
+      </p:nvGrpSpPr>
+      <p:grpSpPr>
+        <a:xfrm>
+          <a:off x="0" y="0"/>
+          <a:ext cx="0" cy="0"/>
+          <a:chOff x="0" y="0"/>
+          <a:chExt cx="0" cy="0"/>
+        </a:xfrm>
+      </p:grpSpPr>
+      <p:sp>
+        <p:nvSpPr>
+          <p:cNvPr id="2" name="页眉占位符 1"/>
+          <p:cNvSpPr>
+            <a:spLocks noGrp="1"/>
+          </p:cNvSpPr>
+          <p:nvPr>
+            <p:ph type="hdr" sz="quarter"/>
+          </p:nvPr>
+        </p:nvSpPr>
+        <p:spPr>
+          <a:xfrm>
+            <a:off x="0" y="0"/>
+            <a:ext cx="2971800" cy="458788"/>
+          </a:xfrm>
+          <a:prstGeom prst="rect">
+            <a:avLst/>
+          </a:prstGeom>
+        </p:spPr>
+        <p:txBody>
+          <a:bodyPr vert="horz" lIns="91440" tIns="45720" rIns="91440" bIns="45720" rtlCol="0"/>
+          <a:lstStyle>
+            <a:lvl1pPr algn="l">
+              <a:defRPr sz="1200"/>
+            </a:lvl1pPr>
+          </a:lstStyle>
+          <a:p>
+            <a:endParaRPr lang="zh-CN" altLang="en-US"/>
+          </a:p>
+        </p:txBody>
+      </p:sp>
+      <p:sp>
+        <p:nvSpPr>
+          <p:cNvPr id="3" name="日期占位符 2"/>
+          <p:cNvSpPr>
+            <a:spLocks noGrp="1"/>
+          </p:cNvSpPr>
+          <p:nvPr>
+            <p:ph type="dt" idx="1"/>
+          </p:nvPr>
+        </p:nvSpPr>
+        <p:spPr>
+          <a:xfrm>
+            <a:off x="3884613" y="0"/>
+            <a:ext cx="2971800" cy="458788"/>
+          </a:xfrm>
+          <a:prstGeom prst="rect">
+            <a:avLst/>
+          </a:prstGeom>
+        </p:spPr>
+        <p:txBody>
+          <a:bodyPr vert="horz" lIns="91440" tIns="45720" rIns="91440" bIns="45720" rtlCol="0"/>
+          <a:lstStyle>
+            <a:lvl1pPr algn="r">
+              <a:defRPr sz="1200"/>
+            </a:lvl1pPr>
+          </a:lstStyle>
+          <a:p>
+            <a:fld id="{03C73472-8066-4150-8EB5-E9AD2BE72F73}" type="datetimeFigureOut">
+              <a:rPr lang="zh-CN" altLang="en-US" smtClean="0"/>
+              <a:t>2022/5/3</a:t>
+            </a:fld>
+            <a:endParaRPr lang="zh-CN" altLang="en-US"/>
+          </a:p>
+        </p:txBody>
+      </p:sp>
+      <p:sp>
+        <p:nvSpPr>
+          <p:cNvPr id="4" name="幻灯片图像占位符 3"/>
+          <p:cNvSpPr>
+            <a:spLocks noGrp="1" noRot="1" noChangeAspect="1"/>
+          </p:cNvSpPr>
+          <p:nvPr>
+            <p:ph type="sldImg" idx="2"/>
+          </p:nvPr>
+        </p:nvSpPr>
+        <p:spPr>
+          <a:xfrm>
+            <a:off x="685800" y="1143000"/>
+            <a:ext cx="5486400" cy="3086100"/>
+          </a:xfrm>
+          <a:prstGeom prst="rect">
+            <a:avLst/>
+          </a:prstGeom>
+          <a:noFill/>
+          <a:ln w="12700">
+            <a:solidFill>
+              <a:prstClr val="black"/>
+            </a:solidFill>
+          </a:ln>
+        </p:spPr>
+        <p:txBody>
+          <a:bodyPr vert="horz" lIns="91440" tIns="45720" rIns="91440" bIns="45720" rtlCol="0" anchor="ctr"/>
+          <a:lstStyle/>
+          <a:p>
+            <a:endParaRPr lang="zh-CN" altLang="en-US"/>
+          </a:p>
+        </p:txBody>
+      </p:sp>
+      <p:sp>
+        <p:nvSpPr>
+          <p:cNvPr id="5" name="备注占位符 4"/>
+          <p:cNvSpPr>
+            <a:spLocks noGrp="1"/>
+          </p:cNvSpPr>
+          <p:nvPr>
+            <p:ph type="body" sz="quarter" idx="3"/>
+          </p:nvPr>
+        </p:nvSpPr>
+        <p:spPr>
+          <a:xfrm>
+            <a:off x="685800" y="4400550"/>
+            <a:ext cx="5486400" cy="3600450"/>
+          </a:xfrm>
+          <a:prstGeom prst="rect">
+            <a:avLst/>
+          </a:prstGeom>
+        </p:spPr>
+        <p:txBody>
+          <a:bodyPr vert="horz" lIns="91440" tIns="45720" rIns="91440" bIns="45720" rtlCol="0"/>
+          <a:lstStyle/>
+          <a:p>
+            <a:pPr lvl="0"/>
+            <a:r>
+              <a:rPr lang="zh-CN" altLang="en-US"/>
+              <a:t>单击此处编辑母版文本样式</a:t>
+            </a:r>
+          </a:p>
+          <a:p>
+            <a:pPr lvl="1"/>
+            <a:r>
+              <a:rPr lang="zh-CN" altLang="en-US"/>
+              <a:t>二级</a:t>
+            </a:r>
+          </a:p>
+          <a:p>
+            <a:pPr lvl="2"/>
+            <a:r>
+              <a:rPr lang="zh-CN" altLang="en-US"/>
+              <a:t>三级</a:t>
+            </a:r>
+          </a:p>
+          <a:p>
+            <a:pPr lvl="3"/>
+            <a:r>
+              <a:rPr lang="zh-CN" altLang="en-US"/>
+              <a:t>四级</a:t>
+            </a:r>
+          </a:p>
+          <a:p>
+            <a:pPr lvl="4"/>
+            <a:r>
+              <a:rPr lang="zh-CN" altLang="en-US"/>
+              <a:t>五级</a:t>
+            </a:r>
+          </a:p>
+        </p:txBody>
+      </p:sp>
+      <p:sp>
+        <p:nvSpPr>
+          <p:cNvPr id="6" name="页脚占位符 5"/>
+          <p:cNvSpPr>
+            <a:spLocks noGrp="1"/>
+          </p:cNvSpPr>
+          <p:nvPr>
+            <p:ph type="ftr" sz="quarter" idx="4"/>
+          </p:nvPr>
+        </p:nvSpPr>
+        <p:spPr>
+          <a:xfrm>
+            <a:off x="0" y="8685213"/>
+            <a:ext cx="2971800" cy="458787"/>
+          </a:xfrm>
+          <a:prstGeom prst="rect">
+            <a:avLst/>
+          </a:prstGeom>
+        </p:spPr>
+        <p:txBody>
+          <a:bodyPr vert="horz" lIns="91440" tIns="45720" rIns="91440" bIns="45720" rtlCol="0" anchor="b"/>
+          <a:lstStyle>
+            <a:lvl1pPr algn="l">
+              <a:defRPr sz="1200"/>
+            </a:lvl1pPr>
+          </a:lstStyle>
+          <a:p>
+            <a:endParaRPr lang="zh-CN" altLang="en-US"/>
+          </a:p>
+        </p:txBody>
+      </p:sp>
+      <p:sp>
+        <p:nvSpPr>
+          <p:cNvPr id="7" name="灯片编号占位符 6"/>
+          <p:cNvSpPr>
+            <a:spLocks noGrp="1"/>
+          </p:cNvSpPr>
+          <p:nvPr>
+            <p:ph type="sldNum" sz="quarter" idx="5"/>
+          </p:nvPr>
+        </p:nvSpPr>
+        <p:spPr>
+          <a:xfrm>
+            <a:off x="3884613" y="8685213"/>
+            <a:ext cx="2971800" cy="458787"/>
+          </a:xfrm>
+          <a:prstGeom prst="rect">
+            <a:avLst/>
+          </a:prstGeom>
+        </p:spPr>
+        <p:txBody>
+          <a:bodyPr vert="horz" lIns="91440" tIns="45720" rIns="91440" bIns="45720" rtlCol="0" anchor="b"/>
+          <a:lstStyle>
+            <a:lvl1pPr algn="r">
+              <a:defRPr sz="1200"/>
+            </a:lvl1pPr>
+          </a:lstStyle>
+          <a:p>
+            <a:fld id="{474EE073-2A52-430B-BC8F-0C3B3CF099B4}" type="slidenum">
+              <a:rPr lang="zh-CN" altLang="en-US" smtClean="0"/>
+              <a:t>‹#›</a:t>
+            </a:fld>
+            <a:endParaRPr lang="zh-CN" altLang="en-US"/>
+          </a:p>
+        </p:txBody>
+      </p:sp>
+    </p:spTree>
+    <p:extLst>
+      <p:ext uri="{BB962C8B-B14F-4D97-AF65-F5344CB8AC3E}">
+        <p14:creationId xmlns:p14="http://schemas.microsoft.com/office/powerpoint/2010/main" val="3999560006"/>
+      </p:ext>
+    </p:extLst>
+  </p:cSld>
+  <p:clrMap bg1="lt1" tx1="dk1" bg2="lt2" tx2="dk2" accent1="accent1" accent2="accent2" accent3="accent3" accent4="accent4" accent5="accent5" accent6="accent6" hlink="hlink" folHlink="folHlink"/>
+  <p:notesStyle>
+    <a:lvl1pPr marL="0" algn="l" defTabSz="914400" rtl="0" eaLnBrk="1" latinLnBrk="0" hangingPunct="1">
+      <a:defRPr sz="1200" kern="1200">
+        <a:solidFill>
+          <a:schemeClr val="tx1"/>
+        </a:solidFill>
+        <a:latin typeface="+mn-lt"/>
+        <a:ea typeface="+mn-ea"/>
+        <a:cs typeface="+mn-cs"/>
+      </a:defRPr>
+    </a:lvl1pPr>
+    <a:lvl2pPr marL="457200" algn="l" defTabSz="914400" rtl="0" eaLnBrk="1" latinLnBrk="0" hangingPunct="1">
+      <a:defRPr sz="1200" kern="1200">
+        <a:solidFill>
+          <a:schemeClr val="tx1"/>
+        </a:solidFill>
+        <a:latin typeface="+mn-lt"/>
+        <a:ea typeface="+mn-ea"/>
+        <a:cs typeface="+mn-cs"/>
+      </a:defRPr>
+    </a:lvl2pPr>
+    <a:lvl3pPr marL="914400" algn="l" defTabSz="914400" rtl="0" eaLnBrk="1" latinLnBrk="0" hangingPunct="1">
+      <a:defRPr sz="1200" kern="1200">
+        <a:solidFill>
+          <a:schemeClr val="tx1"/>
+        </a:solidFill>
+        <a:latin typeface="+mn-lt"/>
+        <a:ea typeface="+mn-ea"/>
+        <a:cs typeface="+mn-cs"/>
+      </a:defRPr>
+    </a:lvl3pPr>
+    <a:lvl4pPr marL="1371600" algn="l" defTabSz="914400" rtl="0" eaLnBrk="1" latinLnBrk="0" hangingPunct="1">
+      <a:defRPr sz="1200" kern="1200">
+        <a:solidFill>
+          <a:schemeClr val="tx1"/>
+        </a:solidFill>
+        <a:latin typeface="+mn-lt"/>
+        <a:ea typeface="+mn-ea"/>
+        <a:cs typeface="+mn-cs"/>
+      </a:defRPr>
+    </a:lvl4pPr>
+    <a:lvl5pPr marL="1828800" algn="l" defTabSz="914400" rtl="0" eaLnBrk="1" latinLnBrk="0" hangingPunct="1">
+      <a:defRPr sz="1200" kern="1200">
+        <a:solidFill>
+          <a:schemeClr val="tx1"/>
+        </a:solidFill>
+        <a:latin typeface="+mn-lt"/>
+        <a:ea typeface="+mn-ea"/>
+        <a:cs typeface="+mn-cs"/>
+      </a:defRPr>
+    </a:lvl5pPr>
+    <a:lvl6pPr marL="2286000" algn="l" defTabSz="914400" rtl="0" eaLnBrk="1" latinLnBrk="0" hangingPunct="1">
+      <a:defRPr sz="1200" kern="1200">
+        <a:solidFill>
+          <a:schemeClr val="tx1"/>
+        </a:solidFill>
+        <a:latin typeface="+mn-lt"/>
+        <a:ea typeface="+mn-ea"/>
+        <a:cs typeface="+mn-cs"/>
+      </a:defRPr>
+    </a:lvl6pPr>
+    <a:lvl7pPr marL="2743200" algn="l" defTabSz="914400" rtl="0" eaLnBrk="1" latinLnBrk="0" hangingPunct="1">
+      <a:defRPr sz="1200" kern="1200">
+        <a:solidFill>
+          <a:schemeClr val="tx1"/>
+        </a:solidFill>
+        <a:latin typeface="+mn-lt"/>
+        <a:ea typeface="+mn-ea"/>
+        <a:cs typeface="+mn-cs"/>
+      </a:defRPr>
+    </a:lvl7pPr>
+    <a:lvl8pPr marL="3200400" algn="l" defTabSz="914400" rtl="0" eaLnBrk="1" latinLnBrk="0" hangingPunct="1">
+      <a:defRPr sz="1200" kern="1200">
+        <a:solidFill>
+          <a:schemeClr val="tx1"/>
+        </a:solidFill>
+        <a:latin typeface="+mn-lt"/>
+        <a:ea typeface="+mn-ea"/>
+        <a:cs typeface="+mn-cs"/>
+      </a:defRPr>
+    </a:lvl8pPr>
+    <a:lvl9pPr marL="3657600" algn="l" defTabSz="914400" rtl="0" eaLnBrk="1" latinLnBrk="0" hangingPunct="1">
+      <a:defRPr sz="1200" kern="1200">
+        <a:solidFill>
+          <a:schemeClr val="tx1"/>
+        </a:solidFill>
+        <a:latin typeface="+mn-lt"/>
+        <a:ea typeface="+mn-ea"/>
+        <a:cs typeface="+mn-cs"/>
+      </a:defRPr>
+    </a:lvl9pPr>
+  </p:notesStyle>
+</p:notesMaster>
+</file>
+
+<file path=ppt/notesSlides/notesSlide1.xml><?xml version="1.0" encoding="utf-8"?>
+<p:notes xmlns:a="http://schemas.openxmlformats.org/drawingml/2006/main" xmlns:r="http://schemas.openxmlformats.org/officeDocument/2006/relationships" xmlns:p="http://schemas.openxmlformats.org/presentationml/2006/main">
+  <p:cSld>
+    <p:spTree>
+      <p:nvGrpSpPr>
+        <p:cNvPr id="1" name=""/>
+        <p:cNvGrpSpPr/>
+        <p:nvPr/>
+      </p:nvGrpSpPr>
+      <p:grpSpPr>
+        <a:xfrm>
+          <a:off x="0" y="0"/>
+          <a:ext cx="0" cy="0"/>
+          <a:chOff x="0" y="0"/>
+          <a:chExt cx="0" cy="0"/>
+        </a:xfrm>
+      </p:grpSpPr>
+      <p:sp>
+        <p:nvSpPr>
+          <p:cNvPr id="2" name="幻灯片图像占位符 1"/>
+          <p:cNvSpPr>
+            <a:spLocks noGrp="1" noRot="1" noChangeAspect="1"/>
+          </p:cNvSpPr>
+          <p:nvPr>
+            <p:ph type="sldImg"/>
+          </p:nvPr>
+        </p:nvSpPr>
+        <p:spPr/>
+      </p:sp>
+      <p:sp>
+        <p:nvSpPr>
+          <p:cNvPr id="3" name="备注占位符 2"/>
+          <p:cNvSpPr>
+            <a:spLocks noGrp="1"/>
+          </p:cNvSpPr>
+          <p:nvPr>
+            <p:ph type="body" idx="1"/>
+          </p:nvPr>
+        </p:nvSpPr>
+        <p:spPr/>
+        <p:txBody>
+          <a:bodyPr/>
+          <a:lstStyle/>
+          <a:p>
+            <a:endParaRPr lang="zh-CN" altLang="en-US" dirty="0"/>
+          </a:p>
+        </p:txBody>
+      </p:sp>
+      <p:sp>
+        <p:nvSpPr>
+          <p:cNvPr id="4" name="灯片编号占位符 3"/>
+          <p:cNvSpPr>
+            <a:spLocks noGrp="1"/>
+          </p:cNvSpPr>
+          <p:nvPr>
+            <p:ph type="sldNum" sz="quarter" idx="5"/>
+          </p:nvPr>
+        </p:nvSpPr>
+        <p:spPr/>
+        <p:txBody>
+          <a:bodyPr/>
+          <a:lstStyle/>
+          <a:p>
+            <a:fld id="{474EE073-2A52-430B-BC8F-0C3B3CF099B4}" type="slidenum">
+              <a:rPr lang="zh-CN" altLang="en-US" smtClean="0"/>
+              <a:t>8</a:t>
+            </a:fld>
+            <a:endParaRPr lang="zh-CN" altLang="en-US"/>
+          </a:p>
+        </p:txBody>
+      </p:sp>
+    </p:spTree>
+    <p:extLst>
+      <p:ext uri="{BB962C8B-B14F-4D97-AF65-F5344CB8AC3E}">
+        <p14:creationId xmlns:p14="http://schemas.microsoft.com/office/powerpoint/2010/main" val="1495951006"/>
+      </p:ext>
+    </p:extLst>
+  </p:cSld>
+  <p:clrMapOvr>
+    <a:masterClrMapping/>
+  </p:clrMapOvr>
+</p:notes>
 </file>
 
 <file path=ppt/slideLayouts/slideLayout1.xml><?xml version="1.0" encoding="utf-8"?>
@@ -323,7 +876,7 @@
           <a:p>
             <a:fld id="{180FFF0B-2889-43C0-854F-96AB7DFD89A0}" type="datetimeFigureOut">
               <a:rPr lang="zh-CN" altLang="en-US" smtClean="0"/>
-              <a:t>2022/5/2</a:t>
+              <a:t>2022/5/3</a:t>
             </a:fld>
             <a:endParaRPr lang="zh-CN" altLang="en-US"/>
           </a:p>
@@ -521,7 +1074,7 @@
           <a:p>
             <a:fld id="{180FFF0B-2889-43C0-854F-96AB7DFD89A0}" type="datetimeFigureOut">
               <a:rPr lang="zh-CN" altLang="en-US" smtClean="0"/>
-              <a:t>2022/5/2</a:t>
+              <a:t>2022/5/3</a:t>
             </a:fld>
             <a:endParaRPr lang="zh-CN" altLang="en-US"/>
           </a:p>
@@ -729,7 +1282,7 @@
           <a:p>
             <a:fld id="{180FFF0B-2889-43C0-854F-96AB7DFD89A0}" type="datetimeFigureOut">
               <a:rPr lang="zh-CN" altLang="en-US" smtClean="0"/>
-              <a:t>2022/5/2</a:t>
+              <a:t>2022/5/3</a:t>
             </a:fld>
             <a:endParaRPr lang="zh-CN" altLang="en-US"/>
           </a:p>
@@ -927,7 +1480,7 @@
           <a:p>
             <a:fld id="{180FFF0B-2889-43C0-854F-96AB7DFD89A0}" type="datetimeFigureOut">
               <a:rPr lang="zh-CN" altLang="en-US" smtClean="0"/>
-              <a:t>2022/5/2</a:t>
+              <a:t>2022/5/3</a:t>
             </a:fld>
             <a:endParaRPr lang="zh-CN" altLang="en-US"/>
           </a:p>
@@ -1202,7 +1755,7 @@
           <a:p>
             <a:fld id="{180FFF0B-2889-43C0-854F-96AB7DFD89A0}" type="datetimeFigureOut">
               <a:rPr lang="zh-CN" altLang="en-US" smtClean="0"/>
-              <a:t>2022/5/2</a:t>
+              <a:t>2022/5/3</a:t>
             </a:fld>
             <a:endParaRPr lang="zh-CN" altLang="en-US"/>
           </a:p>
@@ -1467,7 +2020,7 @@
           <a:p>
             <a:fld id="{180FFF0B-2889-43C0-854F-96AB7DFD89A0}" type="datetimeFigureOut">
               <a:rPr lang="zh-CN" altLang="en-US" smtClean="0"/>
-              <a:t>2022/5/2</a:t>
+              <a:t>2022/5/3</a:t>
             </a:fld>
             <a:endParaRPr lang="zh-CN" altLang="en-US"/>
           </a:p>
@@ -1879,7 +2432,7 @@
           <a:p>
             <a:fld id="{180FFF0B-2889-43C0-854F-96AB7DFD89A0}" type="datetimeFigureOut">
               <a:rPr lang="zh-CN" altLang="en-US" smtClean="0"/>
-              <a:t>2022/5/2</a:t>
+              <a:t>2022/5/3</a:t>
             </a:fld>
             <a:endParaRPr lang="zh-CN" altLang="en-US"/>
           </a:p>
@@ -2020,7 +2573,7 @@
           <a:p>
             <a:fld id="{180FFF0B-2889-43C0-854F-96AB7DFD89A0}" type="datetimeFigureOut">
               <a:rPr lang="zh-CN" altLang="en-US" smtClean="0"/>
-              <a:t>2022/5/2</a:t>
+              <a:t>2022/5/3</a:t>
             </a:fld>
             <a:endParaRPr lang="zh-CN" altLang="en-US"/>
           </a:p>
@@ -2133,7 +2686,7 @@
           <a:p>
             <a:fld id="{180FFF0B-2889-43C0-854F-96AB7DFD89A0}" type="datetimeFigureOut">
               <a:rPr lang="zh-CN" altLang="en-US" smtClean="0"/>
-              <a:t>2022/5/2</a:t>
+              <a:t>2022/5/3</a:t>
             </a:fld>
             <a:endParaRPr lang="zh-CN" altLang="en-US"/>
           </a:p>
@@ -2444,7 +2997,7 @@
           <a:p>
             <a:fld id="{180FFF0B-2889-43C0-854F-96AB7DFD89A0}" type="datetimeFigureOut">
               <a:rPr lang="zh-CN" altLang="en-US" smtClean="0"/>
-              <a:t>2022/5/2</a:t>
+              <a:t>2022/5/3</a:t>
             </a:fld>
             <a:endParaRPr lang="zh-CN" altLang="en-US"/>
           </a:p>
@@ -2732,7 +3285,7 @@
           <a:p>
             <a:fld id="{180FFF0B-2889-43C0-854F-96AB7DFD89A0}" type="datetimeFigureOut">
               <a:rPr lang="zh-CN" altLang="en-US" smtClean="0"/>
-              <a:t>2022/5/2</a:t>
+              <a:t>2022/5/3</a:t>
             </a:fld>
             <a:endParaRPr lang="zh-CN" altLang="en-US"/>
           </a:p>
@@ -2973,7 +3526,7 @@
           <a:p>
             <a:fld id="{180FFF0B-2889-43C0-854F-96AB7DFD89A0}" type="datetimeFigureOut">
               <a:rPr lang="zh-CN" altLang="en-US" smtClean="0"/>
-              <a:t>2022/5/2</a:t>
+              <a:t>2022/5/3</a:t>
             </a:fld>
             <a:endParaRPr lang="zh-CN" altLang="en-US"/>
           </a:p>
@@ -3442,47 +3995,7 @@
           <a:p>
             <a:r>
               <a:rPr lang="en-US" altLang="zh-CN" dirty="0"/>
-              <a:t>Team member: Zhihao Gu, </a:t>
-            </a:r>
-            <a:r>
-              <a:rPr lang="en-US" altLang="zh-CN" dirty="0" err="1"/>
-              <a:t>Chenyang</a:t>
-            </a:r>
-            <a:r>
-              <a:rPr lang="en-US" altLang="zh-CN" dirty="0"/>
-              <a:t> </a:t>
-            </a:r>
-            <a:r>
-              <a:rPr lang="en-US" altLang="zh-CN" dirty="0" err="1"/>
-              <a:t>zhang</a:t>
-            </a:r>
-            <a:r>
-              <a:rPr lang="en-US" altLang="zh-CN" dirty="0"/>
-              <a:t>, </a:t>
-            </a:r>
-            <a:r>
-              <a:rPr lang="en-US" altLang="zh-CN" dirty="0" err="1"/>
-              <a:t>Minghui</a:t>
-            </a:r>
-            <a:r>
-              <a:rPr lang="en-US" altLang="zh-CN" dirty="0"/>
-              <a:t> Yang, </a:t>
-            </a:r>
-            <a:r>
-              <a:rPr lang="en-US" altLang="zh-CN" dirty="0" err="1"/>
-              <a:t>Xiaohan</a:t>
-            </a:r>
-            <a:r>
-              <a:rPr lang="en-US" altLang="zh-CN" dirty="0"/>
-              <a:t> Zou, </a:t>
-            </a:r>
-            <a:r>
-              <a:rPr lang="en-US" altLang="zh-CN" dirty="0" err="1"/>
-              <a:t>Pengchao</a:t>
-            </a:r>
-            <a:r>
-              <a:rPr lang="en-US" altLang="zh-CN" dirty="0"/>
-              <a:t> Yuan.</a:t>
+              <a:t>Team member: Zhihao Gu, Chenyang zhang, Minghui Yang, Xiaohan Zou, Pengchao Yuan.</a:t>
             </a:r>
             <a:endParaRPr lang="zh-CN" altLang="en-US" dirty="0"/>
           </a:p>
@@ -3581,6 +4094,608 @@
     <p:extLst>
       <p:ext uri="{BB962C8B-B14F-4D97-AF65-F5344CB8AC3E}">
         <p14:creationId xmlns:p14="http://schemas.microsoft.com/office/powerpoint/2010/main" val="3455736537"/>
+      </p:ext>
+    </p:extLst>
+  </p:cSld>
+  <p:clrMapOvr>
+    <a:masterClrMapping/>
+  </p:clrMapOvr>
+</p:sld>
+</file>
+
+<file path=ppt/slides/slide3.xml><?xml version="1.0" encoding="utf-8"?>
+<p:sld xmlns:a="http://schemas.openxmlformats.org/drawingml/2006/main" xmlns:r="http://schemas.openxmlformats.org/officeDocument/2006/relationships" xmlns:p="http://schemas.openxmlformats.org/presentationml/2006/main">
+  <p:cSld>
+    <p:spTree>
+      <p:nvGrpSpPr>
+        <p:cNvPr id="1" name=""/>
+        <p:cNvGrpSpPr/>
+        <p:nvPr/>
+      </p:nvGrpSpPr>
+      <p:grpSpPr>
+        <a:xfrm>
+          <a:off x="0" y="0"/>
+          <a:ext cx="0" cy="0"/>
+          <a:chOff x="0" y="0"/>
+          <a:chExt cx="0" cy="0"/>
+        </a:xfrm>
+      </p:grpSpPr>
+      <p:sp>
+        <p:nvSpPr>
+          <p:cNvPr id="2" name="标题 1">
+            <a:extLst>
+              <a:ext uri="{FF2B5EF4-FFF2-40B4-BE49-F238E27FC236}">
+                <a16:creationId xmlns:a16="http://schemas.microsoft.com/office/drawing/2014/main" id="{732F0EC7-8AC8-00BC-BF5F-019FE2F7403F}"/>
+              </a:ext>
+            </a:extLst>
+          </p:cNvPr>
+          <p:cNvSpPr>
+            <a:spLocks noGrp="1"/>
+          </p:cNvSpPr>
+          <p:nvPr>
+            <p:ph type="title"/>
+          </p:nvPr>
+        </p:nvSpPr>
+        <p:spPr/>
+        <p:txBody>
+          <a:bodyPr/>
+          <a:lstStyle/>
+          <a:p>
+            <a:endParaRPr lang="zh-CN" altLang="en-US"/>
+          </a:p>
+        </p:txBody>
+      </p:sp>
+      <p:sp>
+        <p:nvSpPr>
+          <p:cNvPr id="3" name="内容占位符 2">
+            <a:extLst>
+              <a:ext uri="{FF2B5EF4-FFF2-40B4-BE49-F238E27FC236}">
+                <a16:creationId xmlns:a16="http://schemas.microsoft.com/office/drawing/2014/main" id="{486ED9B2-8FA8-9E44-1629-33A309926A6C}"/>
+              </a:ext>
+            </a:extLst>
+          </p:cNvPr>
+          <p:cNvSpPr>
+            <a:spLocks noGrp="1"/>
+          </p:cNvSpPr>
+          <p:nvPr>
+            <p:ph idx="1"/>
+          </p:nvPr>
+        </p:nvSpPr>
+        <p:spPr/>
+        <p:txBody>
+          <a:bodyPr/>
+          <a:lstStyle/>
+          <a:p>
+            <a:endParaRPr lang="zh-CN" altLang="en-US"/>
+          </a:p>
+        </p:txBody>
+      </p:sp>
+    </p:spTree>
+    <p:extLst>
+      <p:ext uri="{BB962C8B-B14F-4D97-AF65-F5344CB8AC3E}">
+        <p14:creationId xmlns:p14="http://schemas.microsoft.com/office/powerpoint/2010/main" val="2135914280"/>
+      </p:ext>
+    </p:extLst>
+  </p:cSld>
+  <p:clrMapOvr>
+    <a:masterClrMapping/>
+  </p:clrMapOvr>
+</p:sld>
+</file>
+
+<file path=ppt/slides/slide4.xml><?xml version="1.0" encoding="utf-8"?>
+<p:sld xmlns:a="http://schemas.openxmlformats.org/drawingml/2006/main" xmlns:r="http://schemas.openxmlformats.org/officeDocument/2006/relationships" xmlns:p="http://schemas.openxmlformats.org/presentationml/2006/main">
+  <p:cSld>
+    <p:spTree>
+      <p:nvGrpSpPr>
+        <p:cNvPr id="1" name=""/>
+        <p:cNvGrpSpPr/>
+        <p:nvPr/>
+      </p:nvGrpSpPr>
+      <p:grpSpPr>
+        <a:xfrm>
+          <a:off x="0" y="0"/>
+          <a:ext cx="0" cy="0"/>
+          <a:chOff x="0" y="0"/>
+          <a:chExt cx="0" cy="0"/>
+        </a:xfrm>
+      </p:grpSpPr>
+      <p:sp>
+        <p:nvSpPr>
+          <p:cNvPr id="2" name="标题 1">
+            <a:extLst>
+              <a:ext uri="{FF2B5EF4-FFF2-40B4-BE49-F238E27FC236}">
+                <a16:creationId xmlns:a16="http://schemas.microsoft.com/office/drawing/2014/main" id="{33A8ABC4-035D-F86A-F44A-C94D356F780E}"/>
+              </a:ext>
+            </a:extLst>
+          </p:cNvPr>
+          <p:cNvSpPr>
+            <a:spLocks noGrp="1"/>
+          </p:cNvSpPr>
+          <p:nvPr>
+            <p:ph type="title"/>
+          </p:nvPr>
+        </p:nvSpPr>
+        <p:spPr/>
+        <p:txBody>
+          <a:bodyPr/>
+          <a:lstStyle/>
+          <a:p>
+            <a:endParaRPr lang="zh-CN" altLang="en-US"/>
+          </a:p>
+        </p:txBody>
+      </p:sp>
+      <p:sp>
+        <p:nvSpPr>
+          <p:cNvPr id="3" name="内容占位符 2">
+            <a:extLst>
+              <a:ext uri="{FF2B5EF4-FFF2-40B4-BE49-F238E27FC236}">
+                <a16:creationId xmlns:a16="http://schemas.microsoft.com/office/drawing/2014/main" id="{E032C3B4-3A4C-A7D4-FA78-B813317C02E5}"/>
+              </a:ext>
+            </a:extLst>
+          </p:cNvPr>
+          <p:cNvSpPr>
+            <a:spLocks noGrp="1"/>
+          </p:cNvSpPr>
+          <p:nvPr>
+            <p:ph idx="1"/>
+          </p:nvPr>
+        </p:nvSpPr>
+        <p:spPr/>
+        <p:txBody>
+          <a:bodyPr/>
+          <a:lstStyle/>
+          <a:p>
+            <a:endParaRPr lang="zh-CN" altLang="en-US"/>
+          </a:p>
+        </p:txBody>
+      </p:sp>
+    </p:spTree>
+    <p:extLst>
+      <p:ext uri="{BB962C8B-B14F-4D97-AF65-F5344CB8AC3E}">
+        <p14:creationId xmlns:p14="http://schemas.microsoft.com/office/powerpoint/2010/main" val="1022795079"/>
+      </p:ext>
+    </p:extLst>
+  </p:cSld>
+  <p:clrMapOvr>
+    <a:masterClrMapping/>
+  </p:clrMapOvr>
+</p:sld>
+</file>
+
+<file path=ppt/slides/slide5.xml><?xml version="1.0" encoding="utf-8"?>
+<p:sld xmlns:a="http://schemas.openxmlformats.org/drawingml/2006/main" xmlns:r="http://schemas.openxmlformats.org/officeDocument/2006/relationships" xmlns:p="http://schemas.openxmlformats.org/presentationml/2006/main">
+  <p:cSld>
+    <p:spTree>
+      <p:nvGrpSpPr>
+        <p:cNvPr id="1" name=""/>
+        <p:cNvGrpSpPr/>
+        <p:nvPr/>
+      </p:nvGrpSpPr>
+      <p:grpSpPr>
+        <a:xfrm>
+          <a:off x="0" y="0"/>
+          <a:ext cx="0" cy="0"/>
+          <a:chOff x="0" y="0"/>
+          <a:chExt cx="0" cy="0"/>
+        </a:xfrm>
+      </p:grpSpPr>
+      <p:sp>
+        <p:nvSpPr>
+          <p:cNvPr id="2" name="标题 1">
+            <a:extLst>
+              <a:ext uri="{FF2B5EF4-FFF2-40B4-BE49-F238E27FC236}">
+                <a16:creationId xmlns:a16="http://schemas.microsoft.com/office/drawing/2014/main" id="{571C99F8-F4B9-0AE1-B828-E77B434D131F}"/>
+              </a:ext>
+            </a:extLst>
+          </p:cNvPr>
+          <p:cNvSpPr>
+            <a:spLocks noGrp="1"/>
+          </p:cNvSpPr>
+          <p:nvPr>
+            <p:ph type="title"/>
+          </p:nvPr>
+        </p:nvSpPr>
+        <p:spPr/>
+        <p:txBody>
+          <a:bodyPr/>
+          <a:lstStyle/>
+          <a:p>
+            <a:endParaRPr lang="zh-CN" altLang="en-US"/>
+          </a:p>
+        </p:txBody>
+      </p:sp>
+      <p:sp>
+        <p:nvSpPr>
+          <p:cNvPr id="3" name="内容占位符 2">
+            <a:extLst>
+              <a:ext uri="{FF2B5EF4-FFF2-40B4-BE49-F238E27FC236}">
+                <a16:creationId xmlns:a16="http://schemas.microsoft.com/office/drawing/2014/main" id="{497546A0-2FBF-5287-47C5-64BAFC260649}"/>
+              </a:ext>
+            </a:extLst>
+          </p:cNvPr>
+          <p:cNvSpPr>
+            <a:spLocks noGrp="1"/>
+          </p:cNvSpPr>
+          <p:nvPr>
+            <p:ph idx="1"/>
+          </p:nvPr>
+        </p:nvSpPr>
+        <p:spPr/>
+        <p:txBody>
+          <a:bodyPr/>
+          <a:lstStyle/>
+          <a:p>
+            <a:endParaRPr lang="zh-CN" altLang="en-US"/>
+          </a:p>
+        </p:txBody>
+      </p:sp>
+    </p:spTree>
+    <p:extLst>
+      <p:ext uri="{BB962C8B-B14F-4D97-AF65-F5344CB8AC3E}">
+        <p14:creationId xmlns:p14="http://schemas.microsoft.com/office/powerpoint/2010/main" val="3305979141"/>
+      </p:ext>
+    </p:extLst>
+  </p:cSld>
+  <p:clrMapOvr>
+    <a:masterClrMapping/>
+  </p:clrMapOvr>
+</p:sld>
+</file>
+
+<file path=ppt/slides/slide6.xml><?xml version="1.0" encoding="utf-8"?>
+<p:sld xmlns:a="http://schemas.openxmlformats.org/drawingml/2006/main" xmlns:r="http://schemas.openxmlformats.org/officeDocument/2006/relationships" xmlns:p="http://schemas.openxmlformats.org/presentationml/2006/main">
+  <p:cSld>
+    <p:spTree>
+      <p:nvGrpSpPr>
+        <p:cNvPr id="1" name=""/>
+        <p:cNvGrpSpPr/>
+        <p:nvPr/>
+      </p:nvGrpSpPr>
+      <p:grpSpPr>
+        <a:xfrm>
+          <a:off x="0" y="0"/>
+          <a:ext cx="0" cy="0"/>
+          <a:chOff x="0" y="0"/>
+          <a:chExt cx="0" cy="0"/>
+        </a:xfrm>
+      </p:grpSpPr>
+      <p:sp>
+        <p:nvSpPr>
+          <p:cNvPr id="2" name="标题 1">
+            <a:extLst>
+              <a:ext uri="{FF2B5EF4-FFF2-40B4-BE49-F238E27FC236}">
+                <a16:creationId xmlns:a16="http://schemas.microsoft.com/office/drawing/2014/main" id="{1A38A379-BB3D-7C46-F3EA-8C2B7AD95A62}"/>
+              </a:ext>
+            </a:extLst>
+          </p:cNvPr>
+          <p:cNvSpPr>
+            <a:spLocks noGrp="1"/>
+          </p:cNvSpPr>
+          <p:nvPr>
+            <p:ph type="title"/>
+          </p:nvPr>
+        </p:nvSpPr>
+        <p:spPr/>
+        <p:txBody>
+          <a:bodyPr/>
+          <a:lstStyle/>
+          <a:p>
+            <a:endParaRPr lang="zh-CN" altLang="en-US"/>
+          </a:p>
+        </p:txBody>
+      </p:sp>
+      <p:sp>
+        <p:nvSpPr>
+          <p:cNvPr id="3" name="内容占位符 2">
+            <a:extLst>
+              <a:ext uri="{FF2B5EF4-FFF2-40B4-BE49-F238E27FC236}">
+                <a16:creationId xmlns:a16="http://schemas.microsoft.com/office/drawing/2014/main" id="{04B0CE83-544D-8ED4-3E60-5AAF310E875C}"/>
+              </a:ext>
+            </a:extLst>
+          </p:cNvPr>
+          <p:cNvSpPr>
+            <a:spLocks noGrp="1"/>
+          </p:cNvSpPr>
+          <p:nvPr>
+            <p:ph idx="1"/>
+          </p:nvPr>
+        </p:nvSpPr>
+        <p:spPr/>
+        <p:txBody>
+          <a:bodyPr/>
+          <a:lstStyle/>
+          <a:p>
+            <a:endParaRPr lang="zh-CN" altLang="en-US"/>
+          </a:p>
+        </p:txBody>
+      </p:sp>
+    </p:spTree>
+    <p:extLst>
+      <p:ext uri="{BB962C8B-B14F-4D97-AF65-F5344CB8AC3E}">
+        <p14:creationId xmlns:p14="http://schemas.microsoft.com/office/powerpoint/2010/main" val="3954431065"/>
+      </p:ext>
+    </p:extLst>
+  </p:cSld>
+  <p:clrMapOvr>
+    <a:masterClrMapping/>
+  </p:clrMapOvr>
+</p:sld>
+</file>
+
+<file path=ppt/slides/slide7.xml><?xml version="1.0" encoding="utf-8"?>
+<p:sld xmlns:a="http://schemas.openxmlformats.org/drawingml/2006/main" xmlns:r="http://schemas.openxmlformats.org/officeDocument/2006/relationships" xmlns:p="http://schemas.openxmlformats.org/presentationml/2006/main">
+  <p:cSld>
+    <p:spTree>
+      <p:nvGrpSpPr>
+        <p:cNvPr id="1" name=""/>
+        <p:cNvGrpSpPr/>
+        <p:nvPr/>
+      </p:nvGrpSpPr>
+      <p:grpSpPr>
+        <a:xfrm>
+          <a:off x="0" y="0"/>
+          <a:ext cx="0" cy="0"/>
+          <a:chOff x="0" y="0"/>
+          <a:chExt cx="0" cy="0"/>
+        </a:xfrm>
+      </p:grpSpPr>
+      <p:sp>
+        <p:nvSpPr>
+          <p:cNvPr id="2" name="标题 1">
+            <a:extLst>
+              <a:ext uri="{FF2B5EF4-FFF2-40B4-BE49-F238E27FC236}">
+                <a16:creationId xmlns:a16="http://schemas.microsoft.com/office/drawing/2014/main" id="{E99262E5-A774-8DEC-1449-24D499ADC7DC}"/>
+              </a:ext>
+            </a:extLst>
+          </p:cNvPr>
+          <p:cNvSpPr>
+            <a:spLocks noGrp="1"/>
+          </p:cNvSpPr>
+          <p:nvPr>
+            <p:ph type="title"/>
+          </p:nvPr>
+        </p:nvSpPr>
+        <p:spPr/>
+        <p:txBody>
+          <a:bodyPr/>
+          <a:lstStyle/>
+          <a:p>
+            <a:r>
+              <a:rPr lang="en-US" altLang="zh-CN" dirty="0"/>
+              <a:t>Portal site</a:t>
+            </a:r>
+            <a:endParaRPr lang="zh-CN" altLang="en-US" dirty="0"/>
+          </a:p>
+        </p:txBody>
+      </p:sp>
+      <p:sp>
+        <p:nvSpPr>
+          <p:cNvPr id="7" name="内容占位符 6">
+            <a:extLst>
+              <a:ext uri="{FF2B5EF4-FFF2-40B4-BE49-F238E27FC236}">
+                <a16:creationId xmlns:a16="http://schemas.microsoft.com/office/drawing/2014/main" id="{44E7CEC9-BA37-73CA-1FC5-F16C873A3BBA}"/>
+              </a:ext>
+            </a:extLst>
+          </p:cNvPr>
+          <p:cNvSpPr>
+            <a:spLocks noGrp="1"/>
+          </p:cNvSpPr>
+          <p:nvPr>
+            <p:ph idx="1"/>
+          </p:nvPr>
+        </p:nvSpPr>
+        <p:spPr/>
+        <p:txBody>
+          <a:bodyPr/>
+          <a:lstStyle/>
+          <a:p>
+            <a:r>
+              <a:rPr lang="en-US" altLang="zh-CN" dirty="0"/>
+              <a:t>We add a portal web page to guide through all kinds of plot.</a:t>
+            </a:r>
+          </a:p>
+          <a:p>
+            <a:endParaRPr lang="zh-CN" altLang="en-US" dirty="0"/>
+          </a:p>
+        </p:txBody>
+      </p:sp>
+    </p:spTree>
+    <p:extLst>
+      <p:ext uri="{BB962C8B-B14F-4D97-AF65-F5344CB8AC3E}">
+        <p14:creationId xmlns:p14="http://schemas.microsoft.com/office/powerpoint/2010/main" val="2036234987"/>
+      </p:ext>
+    </p:extLst>
+  </p:cSld>
+  <p:clrMapOvr>
+    <a:masterClrMapping/>
+  </p:clrMapOvr>
+</p:sld>
+</file>
+
+<file path=ppt/slides/slide8.xml><?xml version="1.0" encoding="utf-8"?>
+<p:sld xmlns:a="http://schemas.openxmlformats.org/drawingml/2006/main" xmlns:r="http://schemas.openxmlformats.org/officeDocument/2006/relationships" xmlns:p="http://schemas.openxmlformats.org/presentationml/2006/main">
+  <p:cSld>
+    <p:spTree>
+      <p:nvGrpSpPr>
+        <p:cNvPr id="1" name=""/>
+        <p:cNvGrpSpPr/>
+        <p:nvPr/>
+      </p:nvGrpSpPr>
+      <p:grpSpPr>
+        <a:xfrm>
+          <a:off x="0" y="0"/>
+          <a:ext cx="0" cy="0"/>
+          <a:chOff x="0" y="0"/>
+          <a:chExt cx="0" cy="0"/>
+        </a:xfrm>
+      </p:grpSpPr>
+      <p:sp>
+        <p:nvSpPr>
+          <p:cNvPr id="2" name="标题 1">
+            <a:extLst>
+              <a:ext uri="{FF2B5EF4-FFF2-40B4-BE49-F238E27FC236}">
+                <a16:creationId xmlns:a16="http://schemas.microsoft.com/office/drawing/2014/main" id="{F4E98FB3-9F44-494B-81EB-911F7DF449FE}"/>
+              </a:ext>
+            </a:extLst>
+          </p:cNvPr>
+          <p:cNvSpPr>
+            <a:spLocks noGrp="1"/>
+          </p:cNvSpPr>
+          <p:nvPr>
+            <p:ph type="title"/>
+          </p:nvPr>
+        </p:nvSpPr>
+        <p:spPr/>
+        <p:txBody>
+          <a:bodyPr/>
+          <a:lstStyle/>
+          <a:p>
+            <a:r>
+              <a:rPr lang="en-US" altLang="zh-CN" dirty="0"/>
+              <a:t>Divide labor:</a:t>
+            </a:r>
+            <a:endParaRPr lang="zh-CN" altLang="en-US" dirty="0"/>
+          </a:p>
+        </p:txBody>
+      </p:sp>
+      <p:sp>
+        <p:nvSpPr>
+          <p:cNvPr id="3" name="内容占位符 2">
+            <a:extLst>
+              <a:ext uri="{FF2B5EF4-FFF2-40B4-BE49-F238E27FC236}">
+                <a16:creationId xmlns:a16="http://schemas.microsoft.com/office/drawing/2014/main" id="{99AB12A4-8D4F-4DA7-B215-CF50025A5537}"/>
+              </a:ext>
+            </a:extLst>
+          </p:cNvPr>
+          <p:cNvSpPr>
+            <a:spLocks noGrp="1"/>
+          </p:cNvSpPr>
+          <p:nvPr>
+            <p:ph idx="1"/>
+          </p:nvPr>
+        </p:nvSpPr>
+        <p:spPr>
+          <a:xfrm>
+            <a:off x="438912" y="1792224"/>
+            <a:ext cx="10914888" cy="4700651"/>
+          </a:xfrm>
+        </p:spPr>
+        <p:txBody>
+          <a:bodyPr>
+            <a:normAutofit lnSpcReduction="10000"/>
+          </a:bodyPr>
+          <a:lstStyle/>
+          <a:p>
+            <a:pPr marL="457200" lvl="1" indent="0">
+              <a:buNone/>
+            </a:pPr>
+            <a:r>
+              <a:rPr lang="en-US" altLang="zh-CN" b="1" dirty="0"/>
+              <a:t>We divide labor equally and adapted to personal skills.</a:t>
+            </a:r>
+          </a:p>
+          <a:p>
+            <a:pPr lvl="1"/>
+            <a:r>
+              <a:rPr lang="en-US" altLang="zh-CN" dirty="0"/>
+              <a:t>Plot by year: Zhihao Gu, Pengchao Yuan</a:t>
+            </a:r>
+          </a:p>
+          <a:p>
+            <a:pPr lvl="1"/>
+            <a:r>
+              <a:rPr lang="en-US" altLang="zh-CN" dirty="0"/>
+              <a:t>Plot by states: Minghui yang, Xiaohan Zou</a:t>
+            </a:r>
+          </a:p>
+          <a:p>
+            <a:pPr lvl="1"/>
+            <a:r>
+              <a:rPr lang="en-US" altLang="zh-CN" dirty="0"/>
+              <a:t>Data process: Chenyang Zhang</a:t>
+            </a:r>
+          </a:p>
+          <a:p>
+            <a:pPr lvl="1"/>
+            <a:r>
+              <a:rPr lang="en-US" altLang="zh-CN" dirty="0"/>
+              <a:t>Heat Map:</a:t>
+            </a:r>
+            <a:r>
+              <a:rPr lang="zh-CN" altLang="en-US" dirty="0"/>
+              <a:t> </a:t>
+            </a:r>
+            <a:r>
+              <a:rPr lang="en-US" altLang="zh-CN" dirty="0"/>
+              <a:t>Pengchao Yuan</a:t>
+            </a:r>
+          </a:p>
+          <a:p>
+            <a:pPr lvl="1"/>
+            <a:r>
+              <a:rPr lang="en-US" altLang="zh-CN" dirty="0"/>
+              <a:t>Data Analysis:</a:t>
+            </a:r>
+          </a:p>
+          <a:p>
+            <a:pPr lvl="2"/>
+            <a:r>
+              <a:rPr lang="en-US" altLang="zh-CN" dirty="0"/>
+              <a:t>Age, Gender: Chenyang Zhang</a:t>
+            </a:r>
+          </a:p>
+          <a:p>
+            <a:pPr lvl="2"/>
+            <a:r>
+              <a:rPr lang="en-US" altLang="zh-CN" dirty="0"/>
+              <a:t>Income: Zhihao Gu</a:t>
+            </a:r>
+          </a:p>
+          <a:p>
+            <a:pPr lvl="2"/>
+            <a:r>
+              <a:rPr lang="en-US" altLang="zh-CN" dirty="0"/>
+              <a:t>Education: Minghui Yang</a:t>
+            </a:r>
+          </a:p>
+          <a:p>
+            <a:pPr lvl="2"/>
+            <a:r>
+              <a:rPr lang="en-US" altLang="zh-CN" dirty="0"/>
+              <a:t>Employment: Xiaohan Zou</a:t>
+            </a:r>
+          </a:p>
+          <a:p>
+            <a:pPr lvl="2"/>
+            <a:r>
+              <a:rPr lang="en-US" altLang="zh-CN" dirty="0"/>
+              <a:t>Poverty: Pengchao Yuan</a:t>
+            </a:r>
+          </a:p>
+          <a:p>
+            <a:pPr lvl="1"/>
+            <a:r>
+              <a:rPr lang="en-US" altLang="zh-CN" dirty="0"/>
+              <a:t>Early Insight: Zhihao Gu</a:t>
+            </a:r>
+          </a:p>
+          <a:p>
+            <a:pPr lvl="1"/>
+            <a:r>
+              <a:rPr lang="en-US" altLang="zh-CN" dirty="0"/>
+              <a:t>Final Presentation: Pengchao(presentation), Zhihao(slide)</a:t>
+            </a:r>
+          </a:p>
+          <a:p>
+            <a:endParaRPr lang="en-US" altLang="zh-CN" dirty="0"/>
+          </a:p>
+        </p:txBody>
+      </p:sp>
+    </p:spTree>
+    <p:extLst>
+      <p:ext uri="{BB962C8B-B14F-4D97-AF65-F5344CB8AC3E}">
+        <p14:creationId xmlns:p14="http://schemas.microsoft.com/office/powerpoint/2010/main" val="2961724078"/>
       </p:ext>
     </p:extLst>
   </p:cSld>
@@ -3883,4 +4998,299 @@
     </a:ext>
   </a:extLst>
 </a:theme>
+</file>
+
+<file path=ppt/theme/theme2.xml><?xml version="1.0" encoding="utf-8"?>
+<a:theme xmlns:a="http://schemas.openxmlformats.org/drawingml/2006/main" name="Office 主题​​">
+  <a:themeElements>
+    <a:clrScheme name="Office">
+      <a:dk1>
+        <a:sysClr val="windowText" lastClr="000000"/>
+      </a:dk1>
+      <a:lt1>
+        <a:sysClr val="window" lastClr="FFFFFF"/>
+      </a:lt1>
+      <a:dk2>
+        <a:srgbClr val="44546A"/>
+      </a:dk2>
+      <a:lt2>
+        <a:srgbClr val="E7E6E6"/>
+      </a:lt2>
+      <a:accent1>
+        <a:srgbClr val="4472C4"/>
+      </a:accent1>
+      <a:accent2>
+        <a:srgbClr val="ED7D31"/>
+      </a:accent2>
+      <a:accent3>
+        <a:srgbClr val="A5A5A5"/>
+      </a:accent3>
+      <a:accent4>
+        <a:srgbClr val="FFC000"/>
+      </a:accent4>
+      <a:accent5>
+        <a:srgbClr val="5B9BD5"/>
+      </a:accent5>
+      <a:accent6>
+        <a:srgbClr val="70AD47"/>
+      </a:accent6>
+      <a:hlink>
+        <a:srgbClr val="0563C1"/>
+      </a:hlink>
+      <a:folHlink>
+        <a:srgbClr val="954F72"/>
+      </a:folHlink>
+    </a:clrScheme>
+    <a:fontScheme name="Office">
+      <a:majorFont>
+        <a:latin typeface="等线 Light" panose="020F0302020204030204"/>
+        <a:ea typeface=""/>
+        <a:cs typeface=""/>
+        <a:font script="Jpan" typeface="游ゴシック Light"/>
+        <a:font script="Hang" typeface="맑은 고딕"/>
+        <a:font script="Hans" typeface="等线 Light"/>
+        <a:font script="Hant" typeface="新細明體"/>
+        <a:font script="Arab" typeface="Times New Roman"/>
+        <a:font script="Hebr" typeface="Times New Roman"/>
+        <a:font script="Thai" typeface="Angsana New"/>
+        <a:font script="Ethi" typeface="Nyala"/>
+        <a:font script="Beng" typeface="Vrinda"/>
+        <a:font script="Gujr" typeface="Shruti"/>
+        <a:font script="Khmr" typeface="MoolBoran"/>
+        <a:font script="Knda" typeface="Tunga"/>
+        <a:font script="Guru" typeface="Raavi"/>
+        <a:font script="Cans" typeface="Euphemia"/>
+        <a:font script="Cher" typeface="Plantagenet Cherokee"/>
+        <a:font script="Yiii" typeface="Microsoft Yi Baiti"/>
+        <a:font script="Tibt" typeface="Microsoft Himalaya"/>
+        <a:font script="Thaa" typeface="MV Boli"/>
+        <a:font script="Deva" typeface="Mangal"/>
+        <a:font script="Telu" typeface="Gautami"/>
+        <a:font script="Taml" typeface="Latha"/>
+        <a:font script="Syrc" typeface="Estrangelo Edessa"/>
+        <a:font script="Orya" typeface="Kalinga"/>
+        <a:font script="Mlym" typeface="Kartika"/>
+        <a:font script="Laoo" typeface="DokChampa"/>
+        <a:font script="Sinh" typeface="Iskoola Pota"/>
+        <a:font script="Mong" typeface="Mongolian Baiti"/>
+        <a:font script="Viet" typeface="Times New Roman"/>
+        <a:font script="Uigh" typeface="Microsoft Uighur"/>
+        <a:font script="Geor" typeface="Sylfaen"/>
+        <a:font script="Armn" typeface="Arial"/>
+        <a:font script="Bugi" typeface="Leelawadee UI"/>
+        <a:font script="Bopo" typeface="Microsoft JhengHei"/>
+        <a:font script="Java" typeface="Javanese Text"/>
+        <a:font script="Lisu" typeface="Segoe UI"/>
+        <a:font script="Mymr" typeface="Myanmar Text"/>
+        <a:font script="Nkoo" typeface="Ebrima"/>
+        <a:font script="Olck" typeface="Nirmala UI"/>
+        <a:font script="Osma" typeface="Ebrima"/>
+        <a:font script="Phag" typeface="Phagspa"/>
+        <a:font script="Syrn" typeface="Estrangelo Edessa"/>
+        <a:font script="Syrj" typeface="Estrangelo Edessa"/>
+        <a:font script="Syre" typeface="Estrangelo Edessa"/>
+        <a:font script="Sora" typeface="Nirmala UI"/>
+        <a:font script="Tale" typeface="Microsoft Tai Le"/>
+        <a:font script="Talu" typeface="Microsoft New Tai Lue"/>
+        <a:font script="Tfng" typeface="Ebrima"/>
+      </a:majorFont>
+      <a:minorFont>
+        <a:latin typeface="等线" panose="020F0502020204030204"/>
+        <a:ea typeface=""/>
+        <a:cs typeface=""/>
+        <a:font script="Jpan" typeface="游ゴシック"/>
+        <a:font script="Hang" typeface="맑은 고딕"/>
+        <a:font script="Hans" typeface="等线"/>
+        <a:font script="Hant" typeface="新細明體"/>
+        <a:font script="Arab" typeface="Arial"/>
+        <a:font script="Hebr" typeface="Arial"/>
+        <a:font script="Thai" typeface="Cordia New"/>
+        <a:font script="Ethi" typeface="Nyala"/>
+        <a:font script="Beng" typeface="Vrinda"/>
+        <a:font script="Gujr" typeface="Shruti"/>
+        <a:font script="Khmr" typeface="DaunPenh"/>
+        <a:font script="Knda" typeface="Tunga"/>
+        <a:font script="Guru" typeface="Raavi"/>
+        <a:font script="Cans" typeface="Euphemia"/>
+        <a:font script="Cher" typeface="Plantagenet Cherokee"/>
+        <a:font script="Yiii" typeface="Microsoft Yi Baiti"/>
+        <a:font script="Tibt" typeface="Microsoft Himalaya"/>
+        <a:font script="Thaa" typeface="MV Boli"/>
+        <a:font script="Deva" typeface="Mangal"/>
+        <a:font script="Telu" typeface="Gautami"/>
+        <a:font script="Taml" typeface="Latha"/>
+        <a:font script="Syrc" typeface="Estrangelo Edessa"/>
+        <a:font script="Orya" typeface="Kalinga"/>
+        <a:font script="Mlym" typeface="Kartika"/>
+        <a:font script="Laoo" typeface="DokChampa"/>
+        <a:font script="Sinh" typeface="Iskoola Pota"/>
+        <a:font script="Mong" typeface="Mongolian Baiti"/>
+        <a:font script="Viet" typeface="Arial"/>
+        <a:font script="Uigh" typeface="Microsoft Uighur"/>
+        <a:font script="Geor" typeface="Sylfaen"/>
+        <a:font script="Armn" typeface="Arial"/>
+        <a:font script="Bugi" typeface="Leelawadee UI"/>
+        <a:font script="Bopo" typeface="Microsoft JhengHei"/>
+        <a:font script="Java" typeface="Javanese Text"/>
+        <a:font script="Lisu" typeface="Segoe UI"/>
+        <a:font script="Mymr" typeface="Myanmar Text"/>
+        <a:font script="Nkoo" typeface="Ebrima"/>
+        <a:font script="Olck" typeface="Nirmala UI"/>
+        <a:font script="Osma" typeface="Ebrima"/>
+        <a:font script="Phag" typeface="Phagspa"/>
+        <a:font script="Syrn" typeface="Estrangelo Edessa"/>
+        <a:font script="Syrj" typeface="Estrangelo Edessa"/>
+        <a:font script="Syre" typeface="Estrangelo Edessa"/>
+        <a:font script="Sora" typeface="Nirmala UI"/>
+        <a:font script="Tale" typeface="Microsoft Tai Le"/>
+        <a:font script="Talu" typeface="Microsoft New Tai Lue"/>
+        <a:font script="Tfng" typeface="Ebrima"/>
+      </a:minorFont>
+    </a:fontScheme>
+    <a:fmtScheme name="Office">
+      <a:fillStyleLst>
+        <a:solidFill>
+          <a:schemeClr val="phClr"/>
+        </a:solidFill>
+        <a:gradFill rotWithShape="1">
+          <a:gsLst>
+            <a:gs pos="0">
+              <a:schemeClr val="phClr">
+                <a:lumMod val="110000"/>
+                <a:satMod val="105000"/>
+                <a:tint val="67000"/>
+              </a:schemeClr>
+            </a:gs>
+            <a:gs pos="50000">
+              <a:schemeClr val="phClr">
+                <a:lumMod val="105000"/>
+                <a:satMod val="103000"/>
+                <a:tint val="73000"/>
+              </a:schemeClr>
+            </a:gs>
+            <a:gs pos="100000">
+              <a:schemeClr val="phClr">
+                <a:lumMod val="105000"/>
+                <a:satMod val="109000"/>
+                <a:tint val="81000"/>
+              </a:schemeClr>
+            </a:gs>
+          </a:gsLst>
+          <a:lin ang="5400000" scaled="0"/>
+        </a:gradFill>
+        <a:gradFill rotWithShape="1">
+          <a:gsLst>
+            <a:gs pos="0">
+              <a:schemeClr val="phClr">
+                <a:satMod val="103000"/>
+                <a:lumMod val="102000"/>
+                <a:tint val="94000"/>
+              </a:schemeClr>
+            </a:gs>
+            <a:gs pos="50000">
+              <a:schemeClr val="phClr">
+                <a:satMod val="110000"/>
+                <a:lumMod val="100000"/>
+                <a:shade val="100000"/>
+              </a:schemeClr>
+            </a:gs>
+            <a:gs pos="100000">
+              <a:schemeClr val="phClr">
+                <a:lumMod val="99000"/>
+                <a:satMod val="120000"/>
+                <a:shade val="78000"/>
+              </a:schemeClr>
+            </a:gs>
+          </a:gsLst>
+          <a:lin ang="5400000" scaled="0"/>
+        </a:gradFill>
+      </a:fillStyleLst>
+      <a:lnStyleLst>
+        <a:ln w="6350" cap="flat" cmpd="sng" algn="ctr">
+          <a:solidFill>
+            <a:schemeClr val="phClr"/>
+          </a:solidFill>
+          <a:prstDash val="solid"/>
+          <a:miter lim="800000"/>
+        </a:ln>
+        <a:ln w="12700" cap="flat" cmpd="sng" algn="ctr">
+          <a:solidFill>
+            <a:schemeClr val="phClr"/>
+          </a:solidFill>
+          <a:prstDash val="solid"/>
+          <a:miter lim="800000"/>
+        </a:ln>
+        <a:ln w="19050" cap="flat" cmpd="sng" algn="ctr">
+          <a:solidFill>
+            <a:schemeClr val="phClr"/>
+          </a:solidFill>
+          <a:prstDash val="solid"/>
+          <a:miter lim="800000"/>
+        </a:ln>
+      </a:lnStyleLst>
+      <a:effectStyleLst>
+        <a:effectStyle>
+          <a:effectLst/>
+        </a:effectStyle>
+        <a:effectStyle>
+          <a:effectLst/>
+        </a:effectStyle>
+        <a:effectStyle>
+          <a:effectLst>
+            <a:outerShdw blurRad="57150" dist="19050" dir="5400000" algn="ctr" rotWithShape="0">
+              <a:srgbClr val="000000">
+                <a:alpha val="63000"/>
+              </a:srgbClr>
+            </a:outerShdw>
+          </a:effectLst>
+        </a:effectStyle>
+      </a:effectStyleLst>
+      <a:bgFillStyleLst>
+        <a:solidFill>
+          <a:schemeClr val="phClr"/>
+        </a:solidFill>
+        <a:solidFill>
+          <a:schemeClr val="phClr">
+            <a:tint val="95000"/>
+            <a:satMod val="170000"/>
+          </a:schemeClr>
+        </a:solidFill>
+        <a:gradFill rotWithShape="1">
+          <a:gsLst>
+            <a:gs pos="0">
+              <a:schemeClr val="phClr">
+                <a:tint val="93000"/>
+                <a:satMod val="150000"/>
+                <a:shade val="98000"/>
+                <a:lumMod val="102000"/>
+              </a:schemeClr>
+            </a:gs>
+            <a:gs pos="50000">
+              <a:schemeClr val="phClr">
+                <a:tint val="98000"/>
+                <a:satMod val="130000"/>
+                <a:shade val="90000"/>
+                <a:lumMod val="103000"/>
+              </a:schemeClr>
+            </a:gs>
+            <a:gs pos="100000">
+              <a:schemeClr val="phClr">
+                <a:shade val="63000"/>
+                <a:satMod val="120000"/>
+              </a:schemeClr>
+            </a:gs>
+          </a:gsLst>
+          <a:lin ang="5400000" scaled="0"/>
+        </a:gradFill>
+      </a:bgFillStyleLst>
+    </a:fmtScheme>
+  </a:themeElements>
+  <a:objectDefaults/>
+  <a:extraClrSchemeLst/>
+  <a:extLst>
+    <a:ext uri="{05A4C25C-085E-4340-85A3-A5531E510DB2}">
+      <thm15:themeFamily xmlns:thm15="http://schemas.microsoft.com/office/thememl/2012/main" name="Office Theme" id="{62F939B6-93AF-4DB8-9C6B-D6C7DFDC589F}" vid="{4A3C46E8-61CC-4603-A589-7422A47A8E4A}"/>
+    </a:ext>
+  </a:extLst>
+</a:theme>
 </file>
</xml_diff>